<commit_message>
added avatars and more hat pics
</commit_message>
<xml_diff>
--- a/TeamIntro/TeamInto.pptx
+++ b/TeamIntro/TeamInto.pptx
@@ -3433,7 +3433,7 @@
       </p:cxnSp>
       <p:pic>
         <p:nvPicPr>
-          <p:cNvPr id="13" name="Picture 12" descr="A picture containing person, clothing, person, smiling&#10;&#10;Description automatically generated">
+          <p:cNvPr id="13" name="Picture 12">
             <a:extLst>
               <a:ext uri="{FF2B5EF4-FFF2-40B4-BE49-F238E27FC236}">
                 <a16:creationId xmlns:a16="http://schemas.microsoft.com/office/drawing/2014/main" id="{E89C99AA-8A60-46F6-8505-622586A16C35}"/>
@@ -3453,9 +3453,8 @@
               </a:ext>
             </a:extLst>
           </a:blip>
-          <a:stretch>
-            <a:fillRect/>
-          </a:stretch>
+          <a:srcRect/>
+          <a:stretch/>
         </p:blipFill>
         <p:spPr>
           <a:xfrm>

</xml_diff>